<commit_message>
Updated architecture of parser to new layout. -> increased font size
</commit_message>
<xml_diff>
--- a/src/resources/Architektur Parser.pptx
+++ b/src/resources/Architektur Parser.pptx
@@ -254,7 +254,7 @@
           <a:p>
             <a:fld id="{1F9C5F64-7036-4DD8-9C41-B9BBF6091C55}" type="datetimeFigureOut">
               <a:rPr lang="de-DE" smtClean="0"/>
-              <a:t>27.06.2018</a:t>
+              <a:t>03.07.2018</a:t>
             </a:fld>
             <a:endParaRPr lang="de-DE"/>
           </a:p>
@@ -424,7 +424,7 @@
           <a:p>
             <a:fld id="{1F9C5F64-7036-4DD8-9C41-B9BBF6091C55}" type="datetimeFigureOut">
               <a:rPr lang="de-DE" smtClean="0"/>
-              <a:t>27.06.2018</a:t>
+              <a:t>03.07.2018</a:t>
             </a:fld>
             <a:endParaRPr lang="de-DE"/>
           </a:p>
@@ -604,7 +604,7 @@
           <a:p>
             <a:fld id="{1F9C5F64-7036-4DD8-9C41-B9BBF6091C55}" type="datetimeFigureOut">
               <a:rPr lang="de-DE" smtClean="0"/>
-              <a:t>27.06.2018</a:t>
+              <a:t>03.07.2018</a:t>
             </a:fld>
             <a:endParaRPr lang="de-DE"/>
           </a:p>
@@ -774,7 +774,7 @@
           <a:p>
             <a:fld id="{1F9C5F64-7036-4DD8-9C41-B9BBF6091C55}" type="datetimeFigureOut">
               <a:rPr lang="de-DE" smtClean="0"/>
-              <a:t>27.06.2018</a:t>
+              <a:t>03.07.2018</a:t>
             </a:fld>
             <a:endParaRPr lang="de-DE"/>
           </a:p>
@@ -1020,7 +1020,7 @@
           <a:p>
             <a:fld id="{1F9C5F64-7036-4DD8-9C41-B9BBF6091C55}" type="datetimeFigureOut">
               <a:rPr lang="de-DE" smtClean="0"/>
-              <a:t>27.06.2018</a:t>
+              <a:t>03.07.2018</a:t>
             </a:fld>
             <a:endParaRPr lang="de-DE"/>
           </a:p>
@@ -1252,7 +1252,7 @@
           <a:p>
             <a:fld id="{1F9C5F64-7036-4DD8-9C41-B9BBF6091C55}" type="datetimeFigureOut">
               <a:rPr lang="de-DE" smtClean="0"/>
-              <a:t>27.06.2018</a:t>
+              <a:t>03.07.2018</a:t>
             </a:fld>
             <a:endParaRPr lang="de-DE"/>
           </a:p>
@@ -1619,7 +1619,7 @@
           <a:p>
             <a:fld id="{1F9C5F64-7036-4DD8-9C41-B9BBF6091C55}" type="datetimeFigureOut">
               <a:rPr lang="de-DE" smtClean="0"/>
-              <a:t>27.06.2018</a:t>
+              <a:t>03.07.2018</a:t>
             </a:fld>
             <a:endParaRPr lang="de-DE"/>
           </a:p>
@@ -1737,7 +1737,7 @@
           <a:p>
             <a:fld id="{1F9C5F64-7036-4DD8-9C41-B9BBF6091C55}" type="datetimeFigureOut">
               <a:rPr lang="de-DE" smtClean="0"/>
-              <a:t>27.06.2018</a:t>
+              <a:t>03.07.2018</a:t>
             </a:fld>
             <a:endParaRPr lang="de-DE"/>
           </a:p>
@@ -1832,7 +1832,7 @@
           <a:p>
             <a:fld id="{1F9C5F64-7036-4DD8-9C41-B9BBF6091C55}" type="datetimeFigureOut">
               <a:rPr lang="de-DE" smtClean="0"/>
-              <a:t>27.06.2018</a:t>
+              <a:t>03.07.2018</a:t>
             </a:fld>
             <a:endParaRPr lang="de-DE"/>
           </a:p>
@@ -2109,7 +2109,7 @@
           <a:p>
             <a:fld id="{1F9C5F64-7036-4DD8-9C41-B9BBF6091C55}" type="datetimeFigureOut">
               <a:rPr lang="de-DE" smtClean="0"/>
-              <a:t>27.06.2018</a:t>
+              <a:t>03.07.2018</a:t>
             </a:fld>
             <a:endParaRPr lang="de-DE"/>
           </a:p>
@@ -2362,7 +2362,7 @@
           <a:p>
             <a:fld id="{1F9C5F64-7036-4DD8-9C41-B9BBF6091C55}" type="datetimeFigureOut">
               <a:rPr lang="de-DE" smtClean="0"/>
-              <a:t>27.06.2018</a:t>
+              <a:t>03.07.2018</a:t>
             </a:fld>
             <a:endParaRPr lang="de-DE"/>
           </a:p>
@@ -2575,7 +2575,7 @@
           <a:p>
             <a:fld id="{1F9C5F64-7036-4DD8-9C41-B9BBF6091C55}" type="datetimeFigureOut">
               <a:rPr lang="de-DE" smtClean="0"/>
-              <a:t>27.06.2018</a:t>
+              <a:t>03.07.2018</a:t>
             </a:fld>
             <a:endParaRPr lang="de-DE"/>
           </a:p>
@@ -3085,7 +3085,7 @@
               <a:lstStyle/>
               <a:p>
                 <a:pPr algn="ctr"/>
-                <a:endParaRPr lang="de-DE"/>
+                <a:endParaRPr lang="de-DE" sz="2400"/>
               </a:p>
             </p:txBody>
           </p:sp>
@@ -3193,14 +3193,14 @@
               <a:p>
                 <a:pPr algn="ctr"/>
                 <a:r>
-                  <a:rPr lang="de-DE" dirty="0" smtClean="0">
+                  <a:rPr lang="de-DE" sz="2400" dirty="0" smtClean="0">
                     <a:solidFill>
                       <a:schemeClr val="tx1"/>
                     </a:solidFill>
                   </a:rPr>
                   <a:t>Parser</a:t>
                 </a:r>
-                <a:endParaRPr lang="de-DE" dirty="0">
+                <a:endParaRPr lang="de-DE" sz="2400" dirty="0">
                   <a:solidFill>
                     <a:schemeClr val="tx1"/>
                   </a:solidFill>
@@ -3252,7 +3252,7 @@
             <a:p>
               <a:pPr algn="ctr"/>
               <a:r>
-                <a:rPr lang="de-DE" dirty="0" err="1" smtClean="0">
+                <a:rPr lang="de-DE" sz="2400" dirty="0" err="1" smtClean="0">
                   <a:solidFill>
                     <a:schemeClr val="tx1"/>
                   </a:solidFill>
@@ -3260,7 +3260,7 @@
                 <a:t>idealo</a:t>
               </a:r>
               <a:r>
-                <a:rPr lang="de-DE" dirty="0">
+                <a:rPr lang="de-DE" sz="2400" dirty="0">
                   <a:solidFill>
                     <a:schemeClr val="tx1"/>
                   </a:solidFill>
@@ -3268,21 +3268,21 @@
                 <a:t/>
               </a:r>
               <a:br>
-                <a:rPr lang="de-DE" dirty="0">
+                <a:rPr lang="de-DE" sz="2400" dirty="0">
                   <a:solidFill>
                     <a:schemeClr val="tx1"/>
                   </a:solidFill>
                 </a:rPr>
               </a:br>
               <a:r>
-                <a:rPr lang="de-DE" dirty="0" smtClean="0">
+                <a:rPr lang="de-DE" sz="2400" dirty="0" smtClean="0">
                   <a:solidFill>
                     <a:schemeClr val="tx1"/>
                   </a:solidFill>
                 </a:rPr>
                 <a:t>Anbindung</a:t>
               </a:r>
-              <a:endParaRPr lang="de-DE" dirty="0">
+              <a:endParaRPr lang="de-DE" sz="2400" dirty="0">
                 <a:solidFill>
                   <a:schemeClr val="tx1"/>
                 </a:solidFill>
@@ -3333,14 +3333,14 @@
             <a:p>
               <a:pPr algn="ctr"/>
               <a:r>
-                <a:rPr lang="de-DE" dirty="0" smtClean="0">
+                <a:rPr lang="de-DE" sz="2400" dirty="0" smtClean="0">
                   <a:solidFill>
                     <a:schemeClr val="tx1"/>
                   </a:solidFill>
                 </a:rPr>
                 <a:t>Shop Rules Generator</a:t>
               </a:r>
-              <a:endParaRPr lang="de-DE" dirty="0">
+              <a:endParaRPr lang="de-DE" sz="2400" dirty="0">
                 <a:solidFill>
                   <a:schemeClr val="tx1"/>
                 </a:solidFill>
@@ -3391,14 +3391,14 @@
             <a:p>
               <a:pPr algn="ctr"/>
               <a:r>
-                <a:rPr lang="de-DE" dirty="0" smtClean="0">
+                <a:rPr lang="de-DE" sz="2400" dirty="0" smtClean="0">
                   <a:solidFill>
                     <a:schemeClr val="tx1"/>
                   </a:solidFill>
                 </a:rPr>
                 <a:t>Regeln</a:t>
               </a:r>
-              <a:endParaRPr lang="de-DE" dirty="0">
+              <a:endParaRPr lang="de-DE" sz="2400" dirty="0">
                 <a:solidFill>
                   <a:schemeClr val="tx1"/>
                 </a:solidFill>
@@ -3449,14 +3449,14 @@
             <a:p>
               <a:pPr algn="ctr"/>
               <a:r>
-                <a:rPr lang="de-DE" dirty="0" smtClean="0">
+                <a:rPr lang="de-DE" sz="2400" dirty="0" smtClean="0">
                   <a:solidFill>
                     <a:schemeClr val="tx1"/>
                   </a:solidFill>
                 </a:rPr>
                 <a:t>Extrahierte Angebote</a:t>
               </a:r>
-              <a:endParaRPr lang="de-DE" dirty="0">
+              <a:endParaRPr lang="de-DE" sz="2400" dirty="0">
                 <a:solidFill>
                   <a:schemeClr val="tx1"/>
                 </a:solidFill>
@@ -3507,14 +3507,14 @@
             <a:p>
               <a:pPr algn="ctr"/>
               <a:r>
-                <a:rPr lang="de-DE" dirty="0" smtClean="0">
+                <a:rPr lang="de-DE" sz="2400" dirty="0" smtClean="0">
                   <a:solidFill>
                     <a:schemeClr val="tx1"/>
                   </a:solidFill>
                 </a:rPr>
                 <a:t>URL-Cleaner</a:t>
               </a:r>
-              <a:endParaRPr lang="de-DE" dirty="0">
+              <a:endParaRPr lang="de-DE" sz="2400" dirty="0">
                 <a:solidFill>
                   <a:schemeClr val="tx1"/>
                 </a:solidFill>
@@ -3948,14 +3948,14 @@
             <a:p>
               <a:pPr algn="ctr"/>
               <a:r>
-                <a:rPr lang="de-DE" dirty="0" smtClean="0">
+                <a:rPr lang="de-DE" sz="2400" dirty="0" smtClean="0">
                   <a:solidFill>
                     <a:schemeClr val="tx1"/>
                   </a:solidFill>
                 </a:rPr>
                 <a:t>Parser-Komponente</a:t>
               </a:r>
-              <a:endParaRPr lang="de-DE" dirty="0">
+              <a:endParaRPr lang="de-DE" sz="2400" dirty="0">
                 <a:solidFill>
                   <a:schemeClr val="tx1"/>
                 </a:solidFill>
@@ -3998,17 +3998,22 @@
             <a:p>
               <a:pPr algn="ctr"/>
               <a:r>
-                <a:rPr lang="de-DE" dirty="0" smtClean="0"/>
+                <a:rPr lang="de-DE" sz="2400" dirty="0" smtClean="0"/>
                 <a:t>gecrawlte     </a:t>
               </a:r>
-              <a:br>
-                <a:rPr lang="de-DE" dirty="0" smtClean="0"/>
-              </a:br>
+              <a:endParaRPr lang="de-DE" sz="2400" dirty="0"/>
+            </a:p>
+            <a:p>
+              <a:pPr algn="ctr"/>
               <a:r>
-                <a:rPr lang="de-DE" dirty="0" smtClean="0"/>
-                <a:t>Webseiten    </a:t>
+                <a:rPr lang="de-DE" sz="2400" dirty="0" smtClean="0"/>
+                <a:t>S</a:t>
               </a:r>
-              <a:endParaRPr lang="de-DE" dirty="0"/>
+              <a:r>
+                <a:rPr lang="de-DE" sz="2400" dirty="0" smtClean="0"/>
+                <a:t>eiten    </a:t>
+              </a:r>
+              <a:endParaRPr lang="de-DE" sz="2400" dirty="0"/>
             </a:p>
           </p:txBody>
         </p:sp>

</xml_diff>